<commit_message>
To complete the rest of the slides
</commit_message>
<xml_diff>
--- a/Prezentare licenta.pptx
+++ b/Prezentare licenta.pptx
@@ -5,7 +5,7 @@
     <p:sldMasterId id="2147483672" r:id="rId1"/>
   </p:sldMasterIdLst>
   <p:handoutMasterIdLst>
-    <p:handoutMasterId r:id="rId10"/>
+    <p:handoutMasterId r:id="rId15"/>
   </p:handoutMasterIdLst>
   <p:sldIdLst>
     <p:sldId id="256" r:id="rId2"/>
@@ -16,6 +16,11 @@
     <p:sldId id="261" r:id="rId7"/>
     <p:sldId id="262" r:id="rId8"/>
     <p:sldId id="263" r:id="rId9"/>
+    <p:sldId id="264" r:id="rId10"/>
+    <p:sldId id="265" r:id="rId11"/>
+    <p:sldId id="266" r:id="rId12"/>
+    <p:sldId id="267" r:id="rId13"/>
+    <p:sldId id="268" r:id="rId14"/>
   </p:sldIdLst>
   <p:sldSz cx="12192000" cy="6858000"/>
   <p:notesSz cx="6858000" cy="9144000"/>
@@ -8379,6 +8384,512 @@
 </p:sld>
 </file>
 
+<file path=ppt/slides/slide10.xml><?xml version="1.0" encoding="utf-8"?>
+<p:sld xmlns:a="http://schemas.openxmlformats.org/drawingml/2006/main" xmlns:r="http://schemas.openxmlformats.org/officeDocument/2006/relationships" xmlns:p="http://schemas.openxmlformats.org/presentationml/2006/main">
+  <p:cSld>
+    <p:spTree>
+      <p:nvGrpSpPr>
+        <p:cNvPr id="1" name=""/>
+        <p:cNvGrpSpPr/>
+        <p:nvPr/>
+      </p:nvGrpSpPr>
+      <p:grpSpPr>
+        <a:xfrm>
+          <a:off x="0" y="0"/>
+          <a:ext cx="0" cy="0"/>
+          <a:chOff x="0" y="0"/>
+          <a:chExt cx="0" cy="0"/>
+        </a:xfrm>
+      </p:grpSpPr>
+      <p:sp>
+        <p:nvSpPr>
+          <p:cNvPr id="2" name="Title 1">
+            <a:extLst>
+              <a:ext uri="{FF2B5EF4-FFF2-40B4-BE49-F238E27FC236}">
+                <a16:creationId xmlns:a16="http://schemas.microsoft.com/office/drawing/2014/main" id="{6B9FC822-C0F5-B7F4-D25B-DDF86E65834B}"/>
+              </a:ext>
+            </a:extLst>
+          </p:cNvPr>
+          <p:cNvSpPr>
+            <a:spLocks noGrp="1"/>
+          </p:cNvSpPr>
+          <p:nvPr>
+            <p:ph type="title"/>
+          </p:nvPr>
+        </p:nvSpPr>
+        <p:spPr>
+          <a:xfrm>
+            <a:off x="1640156" y="603051"/>
+            <a:ext cx="8911687" cy="687454"/>
+          </a:xfrm>
+        </p:spPr>
+        <p:txBody>
+          <a:bodyPr/>
+          <a:lstStyle/>
+          <a:p>
+            <a:r>
+              <a:rPr lang="ro-RO"/>
+              <a:t>MathRunner</a:t>
+            </a:r>
+            <a:endParaRPr lang="en-US"/>
+          </a:p>
+        </p:txBody>
+      </p:sp>
+      <p:sp>
+        <p:nvSpPr>
+          <p:cNvPr id="3" name="Content Placeholder 2">
+            <a:extLst>
+              <a:ext uri="{FF2B5EF4-FFF2-40B4-BE49-F238E27FC236}">
+                <a16:creationId xmlns:a16="http://schemas.microsoft.com/office/drawing/2014/main" id="{B71C2FBE-DE7B-7D23-A51B-F4026B4314AB}"/>
+              </a:ext>
+            </a:extLst>
+          </p:cNvPr>
+          <p:cNvSpPr>
+            <a:spLocks noGrp="1"/>
+          </p:cNvSpPr>
+          <p:nvPr>
+            <p:ph idx="1"/>
+          </p:nvPr>
+        </p:nvSpPr>
+        <p:spPr>
+          <a:xfrm>
+            <a:off x="2718521" y="1821873"/>
+            <a:ext cx="8915400" cy="1607127"/>
+          </a:xfrm>
+        </p:spPr>
+        <p:txBody>
+          <a:bodyPr/>
+          <a:lstStyle/>
+          <a:p>
+            <a:r>
+              <a:rPr lang="ro-RO"/>
+              <a:t>J</a:t>
+            </a:r>
+            <a:r>
+              <a:rPr lang="en-US"/>
+              <a:t>oc 3D care îi provoacă pe jucători să își folosească abilitățile matematice</a:t>
+            </a:r>
+            <a:r>
+              <a:rPr lang="ro-RO"/>
+              <a:t>.</a:t>
+            </a:r>
+          </a:p>
+          <a:p>
+            <a:r>
+              <a:rPr lang="ro-RO"/>
+              <a:t>J</a:t>
+            </a:r>
+            <a:r>
+              <a:rPr lang="it-IT"/>
+              <a:t>uc</a:t>
+            </a:r>
+            <a:r>
+              <a:rPr lang="ro-RO"/>
+              <a:t>ă</a:t>
+            </a:r>
+            <a:r>
+              <a:rPr lang="it-IT"/>
+              <a:t>torii trebuie s</a:t>
+            </a:r>
+            <a:r>
+              <a:rPr lang="ro-RO"/>
+              <a:t>ă</a:t>
+            </a:r>
+            <a:r>
+              <a:rPr lang="it-IT"/>
+              <a:t> aleag</a:t>
+            </a:r>
+            <a:r>
+              <a:rPr lang="ro-RO"/>
+              <a:t>ă</a:t>
+            </a:r>
+            <a:r>
+              <a:rPr lang="it-IT"/>
+              <a:t> r</a:t>
+            </a:r>
+            <a:r>
+              <a:rPr lang="ro-RO"/>
+              <a:t>ă</a:t>
+            </a:r>
+            <a:r>
+              <a:rPr lang="it-IT"/>
+              <a:t>spunsul corect al unei ecua</a:t>
+            </a:r>
+            <a:r>
+              <a:rPr lang="ro-RO"/>
+              <a:t>ț</a:t>
+            </a:r>
+            <a:r>
+              <a:rPr lang="it-IT"/>
+              <a:t>ii matematice</a:t>
+            </a:r>
+            <a:r>
+              <a:rPr lang="ro-RO"/>
+              <a:t>.</a:t>
+            </a:r>
+          </a:p>
+          <a:p>
+            <a:r>
+              <a:rPr lang="ro-RO"/>
+              <a:t>B</a:t>
+            </a:r>
+            <a:r>
+              <a:rPr lang="en-US"/>
+              <a:t>azat pe evitarea de obstacole</a:t>
+            </a:r>
+            <a:r>
+              <a:rPr lang="ro-RO"/>
+              <a:t>.</a:t>
+            </a:r>
+          </a:p>
+          <a:p>
+            <a:r>
+              <a:rPr lang="ro-RO"/>
+              <a:t>Dispune de toți factorii menționați în slide-ul anterior.</a:t>
+            </a:r>
+            <a:endParaRPr lang="en-US"/>
+          </a:p>
+        </p:txBody>
+      </p:sp>
+    </p:spTree>
+    <p:extLst>
+      <p:ext uri="{BB962C8B-B14F-4D97-AF65-F5344CB8AC3E}">
+        <p14:creationId xmlns:p14="http://schemas.microsoft.com/office/powerpoint/2010/main" val="2801074863"/>
+      </p:ext>
+    </p:extLst>
+  </p:cSld>
+  <p:clrMapOvr>
+    <a:masterClrMapping/>
+  </p:clrMapOvr>
+</p:sld>
+</file>
+
+<file path=ppt/slides/slide11.xml><?xml version="1.0" encoding="utf-8"?>
+<p:sld xmlns:a="http://schemas.openxmlformats.org/drawingml/2006/main" xmlns:r="http://schemas.openxmlformats.org/officeDocument/2006/relationships" xmlns:p="http://schemas.openxmlformats.org/presentationml/2006/main">
+  <p:cSld>
+    <p:spTree>
+      <p:nvGrpSpPr>
+        <p:cNvPr id="1" name=""/>
+        <p:cNvGrpSpPr/>
+        <p:nvPr/>
+      </p:nvGrpSpPr>
+      <p:grpSpPr>
+        <a:xfrm>
+          <a:off x="0" y="0"/>
+          <a:ext cx="0" cy="0"/>
+          <a:chOff x="0" y="0"/>
+          <a:chExt cx="0" cy="0"/>
+        </a:xfrm>
+      </p:grpSpPr>
+      <p:sp>
+        <p:nvSpPr>
+          <p:cNvPr id="2" name="Title 1">
+            <a:extLst>
+              <a:ext uri="{FF2B5EF4-FFF2-40B4-BE49-F238E27FC236}">
+                <a16:creationId xmlns:a16="http://schemas.microsoft.com/office/drawing/2014/main" id="{A5E52BB1-0B55-2C8E-5CDB-0EAD3061E8D9}"/>
+              </a:ext>
+            </a:extLst>
+          </p:cNvPr>
+          <p:cNvSpPr>
+            <a:spLocks noGrp="1"/>
+          </p:cNvSpPr>
+          <p:nvPr>
+            <p:ph type="title"/>
+          </p:nvPr>
+        </p:nvSpPr>
+        <p:spPr>
+          <a:xfrm>
+            <a:off x="1640156" y="630760"/>
+            <a:ext cx="8911687" cy="632035"/>
+          </a:xfrm>
+        </p:spPr>
+        <p:txBody>
+          <a:bodyPr>
+            <a:normAutofit fontScale="90000"/>
+          </a:bodyPr>
+          <a:lstStyle/>
+          <a:p>
+            <a:r>
+              <a:rPr lang="en-US"/>
+              <a:t>Intelligence Defense: Learn While You Play!</a:t>
+            </a:r>
+          </a:p>
+        </p:txBody>
+      </p:sp>
+      <p:sp>
+        <p:nvSpPr>
+          <p:cNvPr id="3" name="Content Placeholder 2">
+            <a:extLst>
+              <a:ext uri="{FF2B5EF4-FFF2-40B4-BE49-F238E27FC236}">
+                <a16:creationId xmlns:a16="http://schemas.microsoft.com/office/drawing/2014/main" id="{CF329B2A-A174-DA18-D143-4A2EBCD3B583}"/>
+              </a:ext>
+            </a:extLst>
+          </p:cNvPr>
+          <p:cNvSpPr>
+            <a:spLocks noGrp="1"/>
+          </p:cNvSpPr>
+          <p:nvPr>
+            <p:ph idx="1"/>
+          </p:nvPr>
+        </p:nvSpPr>
+        <p:spPr>
+          <a:xfrm>
+            <a:off x="2690812" y="1801091"/>
+            <a:ext cx="8915400" cy="1729509"/>
+          </a:xfrm>
+        </p:spPr>
+        <p:txBody>
+          <a:bodyPr/>
+          <a:lstStyle/>
+          <a:p>
+            <a:r>
+              <a:rPr lang="ro-RO"/>
+              <a:t>J</a:t>
+            </a:r>
+            <a:r>
+              <a:rPr lang="en-US"/>
+              <a:t>oc 3D în care jucătorii trebuie să își folosească abilitățile strategice și de gândire</a:t>
+            </a:r>
+            <a:r>
+              <a:rPr lang="ro-RO"/>
+              <a:t>.</a:t>
+            </a:r>
+          </a:p>
+          <a:p>
+            <a:r>
+              <a:rPr lang="ro-RO"/>
+              <a:t>S</a:t>
+            </a:r>
+            <a:r>
+              <a:rPr lang="en-US"/>
+              <a:t>copul este de a ap</a:t>
+            </a:r>
+            <a:r>
+              <a:rPr lang="ro-RO"/>
+              <a:t>ă</a:t>
+            </a:r>
+            <a:r>
+              <a:rPr lang="en-US"/>
+              <a:t>ra baza de atacuri inamice</a:t>
+            </a:r>
+            <a:r>
+              <a:rPr lang="ro-RO"/>
+              <a:t>.</a:t>
+            </a:r>
+          </a:p>
+          <a:p>
+            <a:r>
+              <a:rPr lang="ro-RO"/>
+              <a:t>D</a:t>
+            </a:r>
+            <a:r>
+              <a:rPr lang="en-US"/>
+              <a:t>ispune de trei turete de ap</a:t>
+            </a:r>
+            <a:r>
+              <a:rPr lang="ro-RO"/>
+              <a:t>ă</a:t>
+            </a:r>
+            <a:r>
+              <a:rPr lang="en-US"/>
+              <a:t>rare</a:t>
+            </a:r>
+            <a:r>
+              <a:rPr lang="ro-RO"/>
+              <a:t>.</a:t>
+            </a:r>
+            <a:endParaRPr lang="en-US"/>
+          </a:p>
+        </p:txBody>
+      </p:sp>
+    </p:spTree>
+    <p:extLst>
+      <p:ext uri="{BB962C8B-B14F-4D97-AF65-F5344CB8AC3E}">
+        <p14:creationId xmlns:p14="http://schemas.microsoft.com/office/powerpoint/2010/main" val="4218078493"/>
+      </p:ext>
+    </p:extLst>
+  </p:cSld>
+  <p:clrMapOvr>
+    <a:masterClrMapping/>
+  </p:clrMapOvr>
+</p:sld>
+</file>
+
+<file path=ppt/slides/slide12.xml><?xml version="1.0" encoding="utf-8"?>
+<p:sld xmlns:a="http://schemas.openxmlformats.org/drawingml/2006/main" xmlns:r="http://schemas.openxmlformats.org/officeDocument/2006/relationships" xmlns:p="http://schemas.openxmlformats.org/presentationml/2006/main">
+  <p:cSld>
+    <p:spTree>
+      <p:nvGrpSpPr>
+        <p:cNvPr id="1" name=""/>
+        <p:cNvGrpSpPr/>
+        <p:nvPr/>
+      </p:nvGrpSpPr>
+      <p:grpSpPr>
+        <a:xfrm>
+          <a:off x="0" y="0"/>
+          <a:ext cx="0" cy="0"/>
+          <a:chOff x="0" y="0"/>
+          <a:chExt cx="0" cy="0"/>
+        </a:xfrm>
+      </p:grpSpPr>
+      <p:sp>
+        <p:nvSpPr>
+          <p:cNvPr id="2" name="Title 1">
+            <a:extLst>
+              <a:ext uri="{FF2B5EF4-FFF2-40B4-BE49-F238E27FC236}">
+                <a16:creationId xmlns:a16="http://schemas.microsoft.com/office/drawing/2014/main" id="{34A62DF5-4B0D-6443-5E9D-2172F7F6B7FF}"/>
+              </a:ext>
+            </a:extLst>
+          </p:cNvPr>
+          <p:cNvSpPr>
+            <a:spLocks noGrp="1"/>
+          </p:cNvSpPr>
+          <p:nvPr>
+            <p:ph type="title"/>
+          </p:nvPr>
+        </p:nvSpPr>
+        <p:spPr>
+          <a:xfrm>
+            <a:off x="1640156" y="630760"/>
+            <a:ext cx="8911687" cy="632035"/>
+          </a:xfrm>
+        </p:spPr>
+        <p:txBody>
+          <a:bodyPr>
+            <a:normAutofit fontScale="90000"/>
+          </a:bodyPr>
+          <a:lstStyle/>
+          <a:p>
+            <a:r>
+              <a:rPr lang="en-US"/>
+              <a:t>Concluzii/Evaluare rezultate</a:t>
+            </a:r>
+          </a:p>
+        </p:txBody>
+      </p:sp>
+      <p:sp>
+        <p:nvSpPr>
+          <p:cNvPr id="3" name="Content Placeholder 2">
+            <a:extLst>
+              <a:ext uri="{FF2B5EF4-FFF2-40B4-BE49-F238E27FC236}">
+                <a16:creationId xmlns:a16="http://schemas.microsoft.com/office/drawing/2014/main" id="{45E00569-43AB-71E3-2631-4478461B6354}"/>
+              </a:ext>
+            </a:extLst>
+          </p:cNvPr>
+          <p:cNvSpPr>
+            <a:spLocks noGrp="1"/>
+          </p:cNvSpPr>
+          <p:nvPr>
+            <p:ph idx="1"/>
+          </p:nvPr>
+        </p:nvSpPr>
+        <p:spPr>
+          <a:xfrm>
+            <a:off x="2736994" y="1671781"/>
+            <a:ext cx="8915400" cy="3777622"/>
+          </a:xfrm>
+        </p:spPr>
+        <p:txBody>
+          <a:bodyPr/>
+          <a:lstStyle/>
+          <a:p>
+            <a:endParaRPr lang="en-US"/>
+          </a:p>
+        </p:txBody>
+      </p:sp>
+    </p:spTree>
+    <p:extLst>
+      <p:ext uri="{BB962C8B-B14F-4D97-AF65-F5344CB8AC3E}">
+        <p14:creationId xmlns:p14="http://schemas.microsoft.com/office/powerpoint/2010/main" val="685586035"/>
+      </p:ext>
+    </p:extLst>
+  </p:cSld>
+  <p:clrMapOvr>
+    <a:masterClrMapping/>
+  </p:clrMapOvr>
+</p:sld>
+</file>
+
+<file path=ppt/slides/slide13.xml><?xml version="1.0" encoding="utf-8"?>
+<p:sld xmlns:a="http://schemas.openxmlformats.org/drawingml/2006/main" xmlns:r="http://schemas.openxmlformats.org/officeDocument/2006/relationships" xmlns:p="http://schemas.openxmlformats.org/presentationml/2006/main">
+  <p:cSld>
+    <p:spTree>
+      <p:nvGrpSpPr>
+        <p:cNvPr id="1" name=""/>
+        <p:cNvGrpSpPr/>
+        <p:nvPr/>
+      </p:nvGrpSpPr>
+      <p:grpSpPr>
+        <a:xfrm>
+          <a:off x="0" y="0"/>
+          <a:ext cx="0" cy="0"/>
+          <a:chOff x="0" y="0"/>
+          <a:chExt cx="0" cy="0"/>
+        </a:xfrm>
+      </p:grpSpPr>
+      <p:sp>
+        <p:nvSpPr>
+          <p:cNvPr id="2" name="Title 1">
+            <a:extLst>
+              <a:ext uri="{FF2B5EF4-FFF2-40B4-BE49-F238E27FC236}">
+                <a16:creationId xmlns:a16="http://schemas.microsoft.com/office/drawing/2014/main" id="{34EB3D76-FD26-0C5F-EC3D-BA9E5B9F601B}"/>
+              </a:ext>
+            </a:extLst>
+          </p:cNvPr>
+          <p:cNvSpPr>
+            <a:spLocks noGrp="1"/>
+          </p:cNvSpPr>
+          <p:nvPr>
+            <p:ph type="title"/>
+          </p:nvPr>
+        </p:nvSpPr>
+        <p:spPr/>
+        <p:txBody>
+          <a:bodyPr/>
+          <a:lstStyle/>
+          <a:p>
+            <a:endParaRPr lang="en-US"/>
+          </a:p>
+        </p:txBody>
+      </p:sp>
+      <p:sp>
+        <p:nvSpPr>
+          <p:cNvPr id="3" name="Content Placeholder 2">
+            <a:extLst>
+              <a:ext uri="{FF2B5EF4-FFF2-40B4-BE49-F238E27FC236}">
+                <a16:creationId xmlns:a16="http://schemas.microsoft.com/office/drawing/2014/main" id="{C06338FF-2081-6556-63B8-325DC34280CF}"/>
+              </a:ext>
+            </a:extLst>
+          </p:cNvPr>
+          <p:cNvSpPr>
+            <a:spLocks noGrp="1"/>
+          </p:cNvSpPr>
+          <p:nvPr>
+            <p:ph idx="1"/>
+          </p:nvPr>
+        </p:nvSpPr>
+        <p:spPr/>
+        <p:txBody>
+          <a:bodyPr/>
+          <a:lstStyle/>
+          <a:p>
+            <a:endParaRPr lang="en-US"/>
+          </a:p>
+        </p:txBody>
+      </p:sp>
+    </p:spTree>
+    <p:extLst>
+      <p:ext uri="{BB962C8B-B14F-4D97-AF65-F5344CB8AC3E}">
+        <p14:creationId xmlns:p14="http://schemas.microsoft.com/office/powerpoint/2010/main" val="896280435"/>
+      </p:ext>
+    </p:extLst>
+  </p:cSld>
+  <p:clrMapOvr>
+    <a:masterClrMapping/>
+  </p:clrMapOvr>
+</p:sld>
+</file>
+
 <file path=ppt/slides/slide2.xml><?xml version="1.0" encoding="utf-8"?>
 <p:sld xmlns:a="http://schemas.openxmlformats.org/drawingml/2006/main" xmlns:r="http://schemas.openxmlformats.org/officeDocument/2006/relationships" xmlns:p="http://schemas.openxmlformats.org/presentationml/2006/main">
   <p:cSld>
@@ -9127,7 +9638,7 @@
         </p:nvSpPr>
         <p:spPr>
           <a:xfrm>
-            <a:off x="2518190" y="2099483"/>
+            <a:off x="2795281" y="2071774"/>
             <a:ext cx="8915400" cy="3777622"/>
           </a:xfrm>
         </p:spPr>
@@ -10103,6 +10614,545 @@
     <p:extLst>
       <p:ext uri="{BB962C8B-B14F-4D97-AF65-F5344CB8AC3E}">
         <p14:creationId xmlns:p14="http://schemas.microsoft.com/office/powerpoint/2010/main" val="544645858"/>
+      </p:ext>
+    </p:extLst>
+  </p:cSld>
+  <p:clrMapOvr>
+    <a:masterClrMapping/>
+  </p:clrMapOvr>
+</p:sld>
+</file>
+
+<file path=ppt/slides/slide9.xml><?xml version="1.0" encoding="utf-8"?>
+<p:sld xmlns:a="http://schemas.openxmlformats.org/drawingml/2006/main" xmlns:r="http://schemas.openxmlformats.org/officeDocument/2006/relationships" xmlns:p="http://schemas.openxmlformats.org/presentationml/2006/main">
+  <p:cSld>
+    <p:spTree>
+      <p:nvGrpSpPr>
+        <p:cNvPr id="1" name=""/>
+        <p:cNvGrpSpPr/>
+        <p:nvPr/>
+      </p:nvGrpSpPr>
+      <p:grpSpPr>
+        <a:xfrm>
+          <a:off x="0" y="0"/>
+          <a:ext cx="0" cy="0"/>
+          <a:chOff x="0" y="0"/>
+          <a:chExt cx="0" cy="0"/>
+        </a:xfrm>
+      </p:grpSpPr>
+      <p:sp>
+        <p:nvSpPr>
+          <p:cNvPr id="55" name="Arrow: Right 54">
+            <a:extLst>
+              <a:ext uri="{FF2B5EF4-FFF2-40B4-BE49-F238E27FC236}">
+                <a16:creationId xmlns:a16="http://schemas.microsoft.com/office/drawing/2014/main" id="{83E4272E-0A5E-C590-8293-3DC4F1FD6023}"/>
+              </a:ext>
+            </a:extLst>
+          </p:cNvPr>
+          <p:cNvSpPr/>
+          <p:nvPr/>
+        </p:nvSpPr>
+        <p:spPr>
+          <a:xfrm rot="8430878">
+            <a:off x="4695695" y="4465120"/>
+            <a:ext cx="1737360" cy="142765"/>
+          </a:xfrm>
+          <a:prstGeom prst="rightArrow">
+            <a:avLst/>
+          </a:prstGeom>
+        </p:spPr>
+        <p:style>
+          <a:lnRef idx="2">
+            <a:schemeClr val="accent1">
+              <a:shade val="50000"/>
+            </a:schemeClr>
+          </a:lnRef>
+          <a:fillRef idx="1">
+            <a:schemeClr val="accent1"/>
+          </a:fillRef>
+          <a:effectRef idx="0">
+            <a:schemeClr val="accent1"/>
+          </a:effectRef>
+          <a:fontRef idx="minor">
+            <a:schemeClr val="lt1"/>
+          </a:fontRef>
+        </p:style>
+        <p:txBody>
+          <a:bodyPr rtlCol="0" anchor="ctr"/>
+          <a:lstStyle/>
+          <a:p>
+            <a:pPr algn="ctr"/>
+            <a:endParaRPr lang="en-US"/>
+          </a:p>
+        </p:txBody>
+      </p:sp>
+      <p:sp>
+        <p:nvSpPr>
+          <p:cNvPr id="54" name="Arrow: Right 53">
+            <a:extLst>
+              <a:ext uri="{FF2B5EF4-FFF2-40B4-BE49-F238E27FC236}">
+                <a16:creationId xmlns:a16="http://schemas.microsoft.com/office/drawing/2014/main" id="{6FBF92C0-E656-0FE9-C66B-9D6CBBED4531}"/>
+              </a:ext>
+            </a:extLst>
+          </p:cNvPr>
+          <p:cNvSpPr/>
+          <p:nvPr/>
+        </p:nvSpPr>
+        <p:spPr>
+          <a:xfrm rot="2464187">
+            <a:off x="6370842" y="4466604"/>
+            <a:ext cx="1737360" cy="142765"/>
+          </a:xfrm>
+          <a:prstGeom prst="rightArrow">
+            <a:avLst/>
+          </a:prstGeom>
+        </p:spPr>
+        <p:style>
+          <a:lnRef idx="2">
+            <a:schemeClr val="accent1">
+              <a:shade val="50000"/>
+            </a:schemeClr>
+          </a:lnRef>
+          <a:fillRef idx="1">
+            <a:schemeClr val="accent1"/>
+          </a:fillRef>
+          <a:effectRef idx="0">
+            <a:schemeClr val="accent1"/>
+          </a:effectRef>
+          <a:fontRef idx="minor">
+            <a:schemeClr val="lt1"/>
+          </a:fontRef>
+        </p:style>
+        <p:txBody>
+          <a:bodyPr rtlCol="0" anchor="ctr"/>
+          <a:lstStyle/>
+          <a:p>
+            <a:pPr algn="ctr"/>
+            <a:endParaRPr lang="en-US"/>
+          </a:p>
+        </p:txBody>
+      </p:sp>
+      <p:sp>
+        <p:nvSpPr>
+          <p:cNvPr id="53" name="Arrow: Right 52">
+            <a:extLst>
+              <a:ext uri="{FF2B5EF4-FFF2-40B4-BE49-F238E27FC236}">
+                <a16:creationId xmlns:a16="http://schemas.microsoft.com/office/drawing/2014/main" id="{EB1EEA5F-DC55-26E1-75D5-9F287399F663}"/>
+              </a:ext>
+            </a:extLst>
+          </p:cNvPr>
+          <p:cNvSpPr/>
+          <p:nvPr/>
+        </p:nvSpPr>
+        <p:spPr>
+          <a:xfrm rot="19393654">
+            <a:off x="6407600" y="3182129"/>
+            <a:ext cx="1737360" cy="142765"/>
+          </a:xfrm>
+          <a:prstGeom prst="rightArrow">
+            <a:avLst/>
+          </a:prstGeom>
+        </p:spPr>
+        <p:style>
+          <a:lnRef idx="2">
+            <a:schemeClr val="accent1">
+              <a:shade val="50000"/>
+            </a:schemeClr>
+          </a:lnRef>
+          <a:fillRef idx="1">
+            <a:schemeClr val="accent1"/>
+          </a:fillRef>
+          <a:effectRef idx="0">
+            <a:schemeClr val="accent1"/>
+          </a:effectRef>
+          <a:fontRef idx="minor">
+            <a:schemeClr val="lt1"/>
+          </a:fontRef>
+        </p:style>
+        <p:txBody>
+          <a:bodyPr rtlCol="0" anchor="ctr"/>
+          <a:lstStyle/>
+          <a:p>
+            <a:pPr algn="ctr"/>
+            <a:endParaRPr lang="en-US"/>
+          </a:p>
+        </p:txBody>
+      </p:sp>
+      <p:sp>
+        <p:nvSpPr>
+          <p:cNvPr id="2" name="Title 1">
+            <a:extLst>
+              <a:ext uri="{FF2B5EF4-FFF2-40B4-BE49-F238E27FC236}">
+                <a16:creationId xmlns:a16="http://schemas.microsoft.com/office/drawing/2014/main" id="{861FE4D8-BD3E-522E-C054-F030BE63638E}"/>
+              </a:ext>
+            </a:extLst>
+          </p:cNvPr>
+          <p:cNvSpPr>
+            <a:spLocks noGrp="1"/>
+          </p:cNvSpPr>
+          <p:nvPr>
+            <p:ph type="title"/>
+          </p:nvPr>
+        </p:nvSpPr>
+        <p:spPr>
+          <a:xfrm>
+            <a:off x="1640156" y="668498"/>
+            <a:ext cx="8911687" cy="734173"/>
+          </a:xfrm>
+        </p:spPr>
+        <p:txBody>
+          <a:bodyPr/>
+          <a:lstStyle/>
+          <a:p>
+            <a:r>
+              <a:rPr lang="fr-FR"/>
+              <a:t>Ce con</a:t>
+            </a:r>
+            <a:r>
+              <a:rPr lang="ro-RO"/>
+              <a:t>ț</a:t>
+            </a:r>
+            <a:r>
+              <a:rPr lang="fr-FR"/>
+              <a:t>ine un bun joc educa</a:t>
+            </a:r>
+            <a:r>
+              <a:rPr lang="ro-RO"/>
+              <a:t>ț</a:t>
+            </a:r>
+            <a:r>
+              <a:rPr lang="fr-FR"/>
+              <a:t>ional?</a:t>
+            </a:r>
+            <a:endParaRPr lang="en-US"/>
+          </a:p>
+        </p:txBody>
+      </p:sp>
+      <p:sp>
+        <p:nvSpPr>
+          <p:cNvPr id="45" name="TextBox 44">
+            <a:extLst>
+              <a:ext uri="{FF2B5EF4-FFF2-40B4-BE49-F238E27FC236}">
+                <a16:creationId xmlns:a16="http://schemas.microsoft.com/office/drawing/2014/main" id="{AF51770A-0E2B-5E59-3C81-D551FB1055D8}"/>
+              </a:ext>
+            </a:extLst>
+          </p:cNvPr>
+          <p:cNvSpPr txBox="1"/>
+          <p:nvPr/>
+        </p:nvSpPr>
+        <p:spPr>
+          <a:xfrm>
+            <a:off x="2830853" y="2412637"/>
+            <a:ext cx="2121763" cy="369332"/>
+          </a:xfrm>
+          <a:prstGeom prst="rect">
+            <a:avLst/>
+          </a:prstGeom>
+          <a:noFill/>
+        </p:spPr>
+        <p:txBody>
+          <a:bodyPr wrap="square" rtlCol="0">
+            <a:spAutoFit/>
+          </a:bodyPr>
+          <a:lstStyle/>
+          <a:p>
+            <a:r>
+              <a:rPr lang="ro-RO"/>
+              <a:t>O</a:t>
+            </a:r>
+            <a:r>
+              <a:rPr lang="en-US"/>
+              <a:t>biective clare</a:t>
+            </a:r>
+          </a:p>
+        </p:txBody>
+      </p:sp>
+      <p:sp>
+        <p:nvSpPr>
+          <p:cNvPr id="46" name="Arrow: Right 45">
+            <a:extLst>
+              <a:ext uri="{FF2B5EF4-FFF2-40B4-BE49-F238E27FC236}">
+                <a16:creationId xmlns:a16="http://schemas.microsoft.com/office/drawing/2014/main" id="{735602FE-07A7-778E-B1AB-39C3B10A6F12}"/>
+              </a:ext>
+            </a:extLst>
+          </p:cNvPr>
+          <p:cNvSpPr/>
+          <p:nvPr/>
+        </p:nvSpPr>
+        <p:spPr>
+          <a:xfrm rot="12950281">
+            <a:off x="4545896" y="3131076"/>
+            <a:ext cx="1869481" cy="142765"/>
+          </a:xfrm>
+          <a:prstGeom prst="rightArrow">
+            <a:avLst/>
+          </a:prstGeom>
+        </p:spPr>
+        <p:style>
+          <a:lnRef idx="2">
+            <a:schemeClr val="accent1">
+              <a:shade val="50000"/>
+            </a:schemeClr>
+          </a:lnRef>
+          <a:fillRef idx="1">
+            <a:schemeClr val="accent1"/>
+          </a:fillRef>
+          <a:effectRef idx="0">
+            <a:schemeClr val="accent1"/>
+          </a:effectRef>
+          <a:fontRef idx="minor">
+            <a:schemeClr val="lt1"/>
+          </a:fontRef>
+        </p:style>
+        <p:txBody>
+          <a:bodyPr rtlCol="0" anchor="ctr"/>
+          <a:lstStyle/>
+          <a:p>
+            <a:pPr algn="ctr"/>
+            <a:endParaRPr lang="en-US"/>
+          </a:p>
+        </p:txBody>
+      </p:sp>
+      <p:sp>
+        <p:nvSpPr>
+          <p:cNvPr id="47" name="Oval 46">
+            <a:extLst>
+              <a:ext uri="{FF2B5EF4-FFF2-40B4-BE49-F238E27FC236}">
+                <a16:creationId xmlns:a16="http://schemas.microsoft.com/office/drawing/2014/main" id="{D7AD010F-F842-E4D1-5A7A-6CD54C115C44}"/>
+              </a:ext>
+            </a:extLst>
+          </p:cNvPr>
+          <p:cNvSpPr/>
+          <p:nvPr/>
+        </p:nvSpPr>
+        <p:spPr>
+          <a:xfrm>
+            <a:off x="6166867" y="3595456"/>
+            <a:ext cx="484187" cy="470516"/>
+          </a:xfrm>
+          <a:prstGeom prst="ellipse">
+            <a:avLst/>
+          </a:prstGeom>
+        </p:spPr>
+        <p:style>
+          <a:lnRef idx="2">
+            <a:schemeClr val="accent1">
+              <a:shade val="50000"/>
+            </a:schemeClr>
+          </a:lnRef>
+          <a:fillRef idx="1">
+            <a:schemeClr val="accent1"/>
+          </a:fillRef>
+          <a:effectRef idx="0">
+            <a:schemeClr val="accent1"/>
+          </a:effectRef>
+          <a:fontRef idx="minor">
+            <a:schemeClr val="lt1"/>
+          </a:fontRef>
+        </p:style>
+        <p:txBody>
+          <a:bodyPr rtlCol="0" anchor="ctr"/>
+          <a:lstStyle/>
+          <a:p>
+            <a:pPr algn="ctr"/>
+            <a:endParaRPr lang="en-US"/>
+          </a:p>
+        </p:txBody>
+      </p:sp>
+      <p:sp>
+        <p:nvSpPr>
+          <p:cNvPr id="48" name="Arrow: Right 47">
+            <a:extLst>
+              <a:ext uri="{FF2B5EF4-FFF2-40B4-BE49-F238E27FC236}">
+                <a16:creationId xmlns:a16="http://schemas.microsoft.com/office/drawing/2014/main" id="{0963FE95-34F2-E8B2-9D7D-6B03BE2C0C0C}"/>
+              </a:ext>
+            </a:extLst>
+          </p:cNvPr>
+          <p:cNvSpPr/>
+          <p:nvPr/>
+        </p:nvSpPr>
+        <p:spPr>
+          <a:xfrm rot="16200000">
+            <a:off x="5677440" y="2783119"/>
+            <a:ext cx="1463040" cy="142765"/>
+          </a:xfrm>
+          <a:prstGeom prst="rightArrow">
+            <a:avLst/>
+          </a:prstGeom>
+        </p:spPr>
+        <p:style>
+          <a:lnRef idx="2">
+            <a:schemeClr val="accent1">
+              <a:shade val="50000"/>
+            </a:schemeClr>
+          </a:lnRef>
+          <a:fillRef idx="1">
+            <a:schemeClr val="accent1"/>
+          </a:fillRef>
+          <a:effectRef idx="0">
+            <a:schemeClr val="accent1"/>
+          </a:effectRef>
+          <a:fontRef idx="minor">
+            <a:schemeClr val="lt1"/>
+          </a:fontRef>
+        </p:style>
+        <p:txBody>
+          <a:bodyPr rtlCol="0" anchor="ctr"/>
+          <a:lstStyle/>
+          <a:p>
+            <a:pPr algn="ctr"/>
+            <a:endParaRPr lang="en-US"/>
+          </a:p>
+        </p:txBody>
+      </p:sp>
+      <p:sp>
+        <p:nvSpPr>
+          <p:cNvPr id="49" name="TextBox 48">
+            <a:extLst>
+              <a:ext uri="{FF2B5EF4-FFF2-40B4-BE49-F238E27FC236}">
+                <a16:creationId xmlns:a16="http://schemas.microsoft.com/office/drawing/2014/main" id="{312B2C7E-720B-F69C-9088-61D75D831C56}"/>
+              </a:ext>
+            </a:extLst>
+          </p:cNvPr>
+          <p:cNvSpPr txBox="1"/>
+          <p:nvPr/>
+        </p:nvSpPr>
+        <p:spPr>
+          <a:xfrm>
+            <a:off x="5242823" y="1754696"/>
+            <a:ext cx="2332274" cy="369332"/>
+          </a:xfrm>
+          <a:prstGeom prst="rect">
+            <a:avLst/>
+          </a:prstGeom>
+          <a:noFill/>
+        </p:spPr>
+        <p:txBody>
+          <a:bodyPr wrap="square" rtlCol="0">
+            <a:spAutoFit/>
+          </a:bodyPr>
+          <a:lstStyle/>
+          <a:p>
+            <a:r>
+              <a:rPr lang="ro-RO"/>
+              <a:t>Gameplay atractiv</a:t>
+            </a:r>
+            <a:endParaRPr lang="en-US"/>
+          </a:p>
+        </p:txBody>
+      </p:sp>
+      <p:sp>
+        <p:nvSpPr>
+          <p:cNvPr id="50" name="TextBox 49">
+            <a:extLst>
+              <a:ext uri="{FF2B5EF4-FFF2-40B4-BE49-F238E27FC236}">
+                <a16:creationId xmlns:a16="http://schemas.microsoft.com/office/drawing/2014/main" id="{397ACAE0-F5D3-9535-00C2-5B3E0AA1AD3E}"/>
+              </a:ext>
+            </a:extLst>
+          </p:cNvPr>
+          <p:cNvSpPr txBox="1"/>
+          <p:nvPr/>
+        </p:nvSpPr>
+        <p:spPr>
+          <a:xfrm>
+            <a:off x="2461056" y="5002246"/>
+            <a:ext cx="2491560" cy="369332"/>
+          </a:xfrm>
+          <a:prstGeom prst="rect">
+            <a:avLst/>
+          </a:prstGeom>
+          <a:noFill/>
+        </p:spPr>
+        <p:txBody>
+          <a:bodyPr wrap="square" rtlCol="0">
+            <a:spAutoFit/>
+          </a:bodyPr>
+          <a:lstStyle/>
+          <a:p>
+            <a:r>
+              <a:rPr lang="ro-RO"/>
+              <a:t>Sistem de reward-uri</a:t>
+            </a:r>
+            <a:endParaRPr lang="en-US"/>
+          </a:p>
+        </p:txBody>
+      </p:sp>
+      <p:sp>
+        <p:nvSpPr>
+          <p:cNvPr id="51" name="TextBox 50">
+            <a:extLst>
+              <a:ext uri="{FF2B5EF4-FFF2-40B4-BE49-F238E27FC236}">
+                <a16:creationId xmlns:a16="http://schemas.microsoft.com/office/drawing/2014/main" id="{44B227A4-BAFA-3055-A87A-7C747CE50CF5}"/>
+              </a:ext>
+            </a:extLst>
+          </p:cNvPr>
+          <p:cNvSpPr txBox="1"/>
+          <p:nvPr/>
+        </p:nvSpPr>
+        <p:spPr>
+          <a:xfrm>
+            <a:off x="7924208" y="5002246"/>
+            <a:ext cx="2491560" cy="369332"/>
+          </a:xfrm>
+          <a:prstGeom prst="rect">
+            <a:avLst/>
+          </a:prstGeom>
+          <a:noFill/>
+        </p:spPr>
+        <p:txBody>
+          <a:bodyPr wrap="square" rtlCol="0">
+            <a:spAutoFit/>
+          </a:bodyPr>
+          <a:lstStyle/>
+          <a:p>
+            <a:r>
+              <a:rPr lang="ro-RO"/>
+              <a:t>Sistem de feedback</a:t>
+            </a:r>
+            <a:endParaRPr lang="en-US"/>
+          </a:p>
+        </p:txBody>
+      </p:sp>
+      <p:sp>
+        <p:nvSpPr>
+          <p:cNvPr id="52" name="TextBox 51">
+            <a:extLst>
+              <a:ext uri="{FF2B5EF4-FFF2-40B4-BE49-F238E27FC236}">
+                <a16:creationId xmlns:a16="http://schemas.microsoft.com/office/drawing/2014/main" id="{991DF47D-B853-45AE-7681-2CBC0E6F35C8}"/>
+              </a:ext>
+            </a:extLst>
+          </p:cNvPr>
+          <p:cNvSpPr txBox="1"/>
+          <p:nvPr/>
+        </p:nvSpPr>
+        <p:spPr>
+          <a:xfrm>
+            <a:off x="7924208" y="2412637"/>
+            <a:ext cx="3293841" cy="369332"/>
+          </a:xfrm>
+          <a:prstGeom prst="rect">
+            <a:avLst/>
+          </a:prstGeom>
+          <a:noFill/>
+        </p:spPr>
+        <p:txBody>
+          <a:bodyPr wrap="square" rtlCol="0">
+            <a:spAutoFit/>
+          </a:bodyPr>
+          <a:lstStyle/>
+          <a:p>
+            <a:r>
+              <a:rPr lang="ro-RO"/>
+              <a:t>Diferite nivele de dificultate</a:t>
+            </a:r>
+            <a:endParaRPr lang="en-US"/>
+          </a:p>
+        </p:txBody>
+      </p:sp>
+    </p:spTree>
+    <p:extLst>
+      <p:ext uri="{BB962C8B-B14F-4D97-AF65-F5344CB8AC3E}">
+        <p14:creationId xmlns:p14="http://schemas.microsoft.com/office/powerpoint/2010/main" val="260279360"/>
       </p:ext>
     </p:extLst>
   </p:cSld>

</xml_diff>